<commit_message>
wip: strip down app
</commit_message>
<xml_diff>
--- a/app-design/design.pptx
+++ b/app-design/design.pptx
@@ -4,6 +4,9 @@
   <p:sldMasterIdLst>
     <p:sldMasterId id="2147483648" r:id="rId1"/>
   </p:sldMasterIdLst>
+  <p:notesMasterIdLst>
+    <p:notesMasterId r:id="rId7"/>
+  </p:notesMasterIdLst>
   <p:sldIdLst>
     <p:sldId id="258" r:id="rId2"/>
     <p:sldId id="256" r:id="rId3"/>
@@ -110,10 +113,444 @@
   </p:defaultTextStyle>
   <p:extLst>
     <p:ext uri="{EFAFB233-063F-42B5-8137-9DF3F51BA10A}">
-      <p15:sldGuideLst xmlns:p15="http://schemas.microsoft.com/office/powerpoint/2012/main"/>
+      <p15:sldGuideLst xmlns:p15="http://schemas.microsoft.com/office/powerpoint/2012/main" xmlns=""/>
     </p:ext>
   </p:extLst>
 </p:presentation>
+</file>
+
+<file path=ppt/notesMasters/notesMaster1.xml><?xml version="1.0" encoding="utf-8"?>
+<p:notesMaster xmlns:a="http://schemas.openxmlformats.org/drawingml/2006/main" xmlns:r="http://schemas.openxmlformats.org/officeDocument/2006/relationships" xmlns:p="http://schemas.openxmlformats.org/presentationml/2006/main">
+  <p:cSld>
+    <p:bg>
+      <p:bgRef idx="1001">
+        <a:schemeClr val="bg1"/>
+      </p:bgRef>
+    </p:bg>
+    <p:spTree>
+      <p:nvGrpSpPr>
+        <p:cNvPr id="1" name=""/>
+        <p:cNvGrpSpPr/>
+        <p:nvPr/>
+      </p:nvGrpSpPr>
+      <p:grpSpPr>
+        <a:xfrm>
+          <a:off x="0" y="0"/>
+          <a:ext cx="0" cy="0"/>
+          <a:chOff x="0" y="0"/>
+          <a:chExt cx="0" cy="0"/>
+        </a:xfrm>
+      </p:grpSpPr>
+      <p:sp>
+        <p:nvSpPr>
+          <p:cNvPr id="2" name="Header Placeholder 1"/>
+          <p:cNvSpPr>
+            <a:spLocks noGrp="1"/>
+          </p:cNvSpPr>
+          <p:nvPr>
+            <p:ph type="hdr" sz="quarter"/>
+          </p:nvPr>
+        </p:nvSpPr>
+        <p:spPr>
+          <a:xfrm>
+            <a:off x="0" y="0"/>
+            <a:ext cx="2971800" cy="457200"/>
+          </a:xfrm>
+          <a:prstGeom prst="rect">
+            <a:avLst/>
+          </a:prstGeom>
+        </p:spPr>
+        <p:txBody>
+          <a:bodyPr vert="horz" lIns="91440" tIns="45720" rIns="91440" bIns="45720" rtlCol="0"/>
+          <a:lstStyle>
+            <a:lvl1pPr algn="l">
+              <a:defRPr sz="1200"/>
+            </a:lvl1pPr>
+          </a:lstStyle>
+          <a:p>
+            <a:endParaRPr lang="en-US"/>
+          </a:p>
+        </p:txBody>
+      </p:sp>
+      <p:sp>
+        <p:nvSpPr>
+          <p:cNvPr id="3" name="Date Placeholder 2"/>
+          <p:cNvSpPr>
+            <a:spLocks noGrp="1"/>
+          </p:cNvSpPr>
+          <p:nvPr>
+            <p:ph type="dt" idx="1"/>
+          </p:nvPr>
+        </p:nvSpPr>
+        <p:spPr>
+          <a:xfrm>
+            <a:off x="3884613" y="0"/>
+            <a:ext cx="2971800" cy="457200"/>
+          </a:xfrm>
+          <a:prstGeom prst="rect">
+            <a:avLst/>
+          </a:prstGeom>
+        </p:spPr>
+        <p:txBody>
+          <a:bodyPr vert="horz" lIns="91440" tIns="45720" rIns="91440" bIns="45720" rtlCol="0"/>
+          <a:lstStyle>
+            <a:lvl1pPr algn="r">
+              <a:defRPr sz="1200"/>
+            </a:lvl1pPr>
+          </a:lstStyle>
+          <a:p>
+            <a:fld id="{156A204A-09E7-4218-B1FA-51372D06CB08}" type="datetimeFigureOut">
+              <a:rPr lang="en-US" smtClean="0"/>
+              <a:t>5/27/2017</a:t>
+            </a:fld>
+            <a:endParaRPr lang="en-US"/>
+          </a:p>
+        </p:txBody>
+      </p:sp>
+      <p:sp>
+        <p:nvSpPr>
+          <p:cNvPr id="4" name="Slide Image Placeholder 3"/>
+          <p:cNvSpPr>
+            <a:spLocks noGrp="1" noRot="1" noChangeAspect="1"/>
+          </p:cNvSpPr>
+          <p:nvPr>
+            <p:ph type="sldImg" idx="2"/>
+          </p:nvPr>
+        </p:nvSpPr>
+        <p:spPr>
+          <a:xfrm>
+            <a:off x="381000" y="685800"/>
+            <a:ext cx="6096000" cy="3429000"/>
+          </a:xfrm>
+          <a:prstGeom prst="rect">
+            <a:avLst/>
+          </a:prstGeom>
+          <a:noFill/>
+          <a:ln w="12700">
+            <a:solidFill>
+              <a:prstClr val="black"/>
+            </a:solidFill>
+          </a:ln>
+        </p:spPr>
+        <p:txBody>
+          <a:bodyPr vert="horz" lIns="91440" tIns="45720" rIns="91440" bIns="45720" rtlCol="0" anchor="ctr"/>
+          <a:lstStyle/>
+          <a:p>
+            <a:endParaRPr lang="en-US"/>
+          </a:p>
+        </p:txBody>
+      </p:sp>
+      <p:sp>
+        <p:nvSpPr>
+          <p:cNvPr id="5" name="Notes Placeholder 4"/>
+          <p:cNvSpPr>
+            <a:spLocks noGrp="1"/>
+          </p:cNvSpPr>
+          <p:nvPr>
+            <p:ph type="body" sz="quarter" idx="3"/>
+          </p:nvPr>
+        </p:nvSpPr>
+        <p:spPr>
+          <a:xfrm>
+            <a:off x="685800" y="4343400"/>
+            <a:ext cx="5486400" cy="4114800"/>
+          </a:xfrm>
+          <a:prstGeom prst="rect">
+            <a:avLst/>
+          </a:prstGeom>
+        </p:spPr>
+        <p:txBody>
+          <a:bodyPr vert="horz" lIns="91440" tIns="45720" rIns="91440" bIns="45720" rtlCol="0"/>
+          <a:lstStyle/>
+          <a:p>
+            <a:pPr lvl="0"/>
+            <a:r>
+              <a:rPr lang="en-US" smtClean="0"/>
+              <a:t>Click to edit Master text styles</a:t>
+            </a:r>
+          </a:p>
+          <a:p>
+            <a:pPr lvl="1"/>
+            <a:r>
+              <a:rPr lang="en-US" smtClean="0"/>
+              <a:t>Second level</a:t>
+            </a:r>
+          </a:p>
+          <a:p>
+            <a:pPr lvl="2"/>
+            <a:r>
+              <a:rPr lang="en-US" smtClean="0"/>
+              <a:t>Third level</a:t>
+            </a:r>
+          </a:p>
+          <a:p>
+            <a:pPr lvl="3"/>
+            <a:r>
+              <a:rPr lang="en-US" smtClean="0"/>
+              <a:t>Fourth level</a:t>
+            </a:r>
+          </a:p>
+          <a:p>
+            <a:pPr lvl="4"/>
+            <a:r>
+              <a:rPr lang="en-US" smtClean="0"/>
+              <a:t>Fifth level</a:t>
+            </a:r>
+            <a:endParaRPr lang="en-US"/>
+          </a:p>
+        </p:txBody>
+      </p:sp>
+      <p:sp>
+        <p:nvSpPr>
+          <p:cNvPr id="6" name="Footer Placeholder 5"/>
+          <p:cNvSpPr>
+            <a:spLocks noGrp="1"/>
+          </p:cNvSpPr>
+          <p:nvPr>
+            <p:ph type="ftr" sz="quarter" idx="4"/>
+          </p:nvPr>
+        </p:nvSpPr>
+        <p:spPr>
+          <a:xfrm>
+            <a:off x="0" y="8685213"/>
+            <a:ext cx="2971800" cy="457200"/>
+          </a:xfrm>
+          <a:prstGeom prst="rect">
+            <a:avLst/>
+          </a:prstGeom>
+        </p:spPr>
+        <p:txBody>
+          <a:bodyPr vert="horz" lIns="91440" tIns="45720" rIns="91440" bIns="45720" rtlCol="0" anchor="b"/>
+          <a:lstStyle>
+            <a:lvl1pPr algn="l">
+              <a:defRPr sz="1200"/>
+            </a:lvl1pPr>
+          </a:lstStyle>
+          <a:p>
+            <a:endParaRPr lang="en-US"/>
+          </a:p>
+        </p:txBody>
+      </p:sp>
+      <p:sp>
+        <p:nvSpPr>
+          <p:cNvPr id="7" name="Slide Number Placeholder 6"/>
+          <p:cNvSpPr>
+            <a:spLocks noGrp="1"/>
+          </p:cNvSpPr>
+          <p:nvPr>
+            <p:ph type="sldNum" sz="quarter" idx="5"/>
+          </p:nvPr>
+        </p:nvSpPr>
+        <p:spPr>
+          <a:xfrm>
+            <a:off x="3884613" y="8685213"/>
+            <a:ext cx="2971800" cy="457200"/>
+          </a:xfrm>
+          <a:prstGeom prst="rect">
+            <a:avLst/>
+          </a:prstGeom>
+        </p:spPr>
+        <p:txBody>
+          <a:bodyPr vert="horz" lIns="91440" tIns="45720" rIns="91440" bIns="45720" rtlCol="0" anchor="b"/>
+          <a:lstStyle>
+            <a:lvl1pPr algn="r">
+              <a:defRPr sz="1200"/>
+            </a:lvl1pPr>
+          </a:lstStyle>
+          <a:p>
+            <a:fld id="{317953DD-19C4-4F4D-B2BF-0592820669C2}" type="slidenum">
+              <a:rPr lang="en-US" smtClean="0"/>
+              <a:t>‹#›</a:t>
+            </a:fld>
+            <a:endParaRPr lang="en-US"/>
+          </a:p>
+        </p:txBody>
+      </p:sp>
+    </p:spTree>
+    <p:extLst>
+      <p:ext uri="{BB962C8B-B14F-4D97-AF65-F5344CB8AC3E}">
+        <p14:creationId xmlns:p14="http://schemas.microsoft.com/office/powerpoint/2010/main" val="3143864105"/>
+      </p:ext>
+    </p:extLst>
+  </p:cSld>
+  <p:clrMap bg1="lt1" tx1="dk1" bg2="lt2" tx2="dk2" accent1="accent1" accent2="accent2" accent3="accent3" accent4="accent4" accent5="accent5" accent6="accent6" hlink="hlink" folHlink="folHlink"/>
+  <p:notesStyle>
+    <a:lvl1pPr marL="0" algn="l" defTabSz="914400" rtl="0" eaLnBrk="1" latinLnBrk="0" hangingPunct="1">
+      <a:defRPr sz="1200" kern="1200">
+        <a:solidFill>
+          <a:schemeClr val="tx1"/>
+        </a:solidFill>
+        <a:latin typeface="+mn-lt"/>
+        <a:ea typeface="+mn-ea"/>
+        <a:cs typeface="+mn-cs"/>
+      </a:defRPr>
+    </a:lvl1pPr>
+    <a:lvl2pPr marL="457200" algn="l" defTabSz="914400" rtl="0" eaLnBrk="1" latinLnBrk="0" hangingPunct="1">
+      <a:defRPr sz="1200" kern="1200">
+        <a:solidFill>
+          <a:schemeClr val="tx1"/>
+        </a:solidFill>
+        <a:latin typeface="+mn-lt"/>
+        <a:ea typeface="+mn-ea"/>
+        <a:cs typeface="+mn-cs"/>
+      </a:defRPr>
+    </a:lvl2pPr>
+    <a:lvl3pPr marL="914400" algn="l" defTabSz="914400" rtl="0" eaLnBrk="1" latinLnBrk="0" hangingPunct="1">
+      <a:defRPr sz="1200" kern="1200">
+        <a:solidFill>
+          <a:schemeClr val="tx1"/>
+        </a:solidFill>
+        <a:latin typeface="+mn-lt"/>
+        <a:ea typeface="+mn-ea"/>
+        <a:cs typeface="+mn-cs"/>
+      </a:defRPr>
+    </a:lvl3pPr>
+    <a:lvl4pPr marL="1371600" algn="l" defTabSz="914400" rtl="0" eaLnBrk="1" latinLnBrk="0" hangingPunct="1">
+      <a:defRPr sz="1200" kern="1200">
+        <a:solidFill>
+          <a:schemeClr val="tx1"/>
+        </a:solidFill>
+        <a:latin typeface="+mn-lt"/>
+        <a:ea typeface="+mn-ea"/>
+        <a:cs typeface="+mn-cs"/>
+      </a:defRPr>
+    </a:lvl4pPr>
+    <a:lvl5pPr marL="1828800" algn="l" defTabSz="914400" rtl="0" eaLnBrk="1" latinLnBrk="0" hangingPunct="1">
+      <a:defRPr sz="1200" kern="1200">
+        <a:solidFill>
+          <a:schemeClr val="tx1"/>
+        </a:solidFill>
+        <a:latin typeface="+mn-lt"/>
+        <a:ea typeface="+mn-ea"/>
+        <a:cs typeface="+mn-cs"/>
+      </a:defRPr>
+    </a:lvl5pPr>
+    <a:lvl6pPr marL="2286000" algn="l" defTabSz="914400" rtl="0" eaLnBrk="1" latinLnBrk="0" hangingPunct="1">
+      <a:defRPr sz="1200" kern="1200">
+        <a:solidFill>
+          <a:schemeClr val="tx1"/>
+        </a:solidFill>
+        <a:latin typeface="+mn-lt"/>
+        <a:ea typeface="+mn-ea"/>
+        <a:cs typeface="+mn-cs"/>
+      </a:defRPr>
+    </a:lvl6pPr>
+    <a:lvl7pPr marL="2743200" algn="l" defTabSz="914400" rtl="0" eaLnBrk="1" latinLnBrk="0" hangingPunct="1">
+      <a:defRPr sz="1200" kern="1200">
+        <a:solidFill>
+          <a:schemeClr val="tx1"/>
+        </a:solidFill>
+        <a:latin typeface="+mn-lt"/>
+        <a:ea typeface="+mn-ea"/>
+        <a:cs typeface="+mn-cs"/>
+      </a:defRPr>
+    </a:lvl7pPr>
+    <a:lvl8pPr marL="3200400" algn="l" defTabSz="914400" rtl="0" eaLnBrk="1" latinLnBrk="0" hangingPunct="1">
+      <a:defRPr sz="1200" kern="1200">
+        <a:solidFill>
+          <a:schemeClr val="tx1"/>
+        </a:solidFill>
+        <a:latin typeface="+mn-lt"/>
+        <a:ea typeface="+mn-ea"/>
+        <a:cs typeface="+mn-cs"/>
+      </a:defRPr>
+    </a:lvl8pPr>
+    <a:lvl9pPr marL="3657600" algn="l" defTabSz="914400" rtl="0" eaLnBrk="1" latinLnBrk="0" hangingPunct="1">
+      <a:defRPr sz="1200" kern="1200">
+        <a:solidFill>
+          <a:schemeClr val="tx1"/>
+        </a:solidFill>
+        <a:latin typeface="+mn-lt"/>
+        <a:ea typeface="+mn-ea"/>
+        <a:cs typeface="+mn-cs"/>
+      </a:defRPr>
+    </a:lvl9pPr>
+  </p:notesStyle>
+</p:notesMaster>
+</file>
+
+<file path=ppt/notesSlides/notesSlide1.xml><?xml version="1.0" encoding="utf-8"?>
+<p:notes xmlns:a="http://schemas.openxmlformats.org/drawingml/2006/main" xmlns:r="http://schemas.openxmlformats.org/officeDocument/2006/relationships" xmlns:p="http://schemas.openxmlformats.org/presentationml/2006/main">
+  <p:cSld>
+    <p:spTree>
+      <p:nvGrpSpPr>
+        <p:cNvPr id="1" name=""/>
+        <p:cNvGrpSpPr/>
+        <p:nvPr/>
+      </p:nvGrpSpPr>
+      <p:grpSpPr>
+        <a:xfrm>
+          <a:off x="0" y="0"/>
+          <a:ext cx="0" cy="0"/>
+          <a:chOff x="0" y="0"/>
+          <a:chExt cx="0" cy="0"/>
+        </a:xfrm>
+      </p:grpSpPr>
+      <p:sp>
+        <p:nvSpPr>
+          <p:cNvPr id="2" name="Slide Image Placeholder 1"/>
+          <p:cNvSpPr>
+            <a:spLocks noGrp="1" noRot="1" noChangeAspect="1"/>
+          </p:cNvSpPr>
+          <p:nvPr>
+            <p:ph type="sldImg"/>
+          </p:nvPr>
+        </p:nvSpPr>
+        <p:spPr/>
+      </p:sp>
+      <p:sp>
+        <p:nvSpPr>
+          <p:cNvPr id="3" name="Notes Placeholder 2"/>
+          <p:cNvSpPr>
+            <a:spLocks noGrp="1"/>
+          </p:cNvSpPr>
+          <p:nvPr>
+            <p:ph type="body" idx="1"/>
+          </p:nvPr>
+        </p:nvSpPr>
+        <p:spPr/>
+        <p:txBody>
+          <a:bodyPr/>
+          <a:lstStyle/>
+          <a:p>
+            <a:endParaRPr lang="en-US" dirty="0"/>
+          </a:p>
+        </p:txBody>
+      </p:sp>
+      <p:sp>
+        <p:nvSpPr>
+          <p:cNvPr id="4" name="Slide Number Placeholder 3"/>
+          <p:cNvSpPr>
+            <a:spLocks noGrp="1"/>
+          </p:cNvSpPr>
+          <p:nvPr>
+            <p:ph type="sldNum" sz="quarter" idx="10"/>
+          </p:nvPr>
+        </p:nvSpPr>
+        <p:spPr/>
+        <p:txBody>
+          <a:bodyPr/>
+          <a:lstStyle/>
+          <a:p>
+            <a:fld id="{317953DD-19C4-4F4D-B2BF-0592820669C2}" type="slidenum">
+              <a:rPr lang="en-US" smtClean="0"/>
+              <a:t>1</a:t>
+            </a:fld>
+            <a:endParaRPr lang="en-US"/>
+          </a:p>
+        </p:txBody>
+      </p:sp>
+    </p:spTree>
+    <p:extLst>
+      <p:ext uri="{BB962C8B-B14F-4D97-AF65-F5344CB8AC3E}">
+        <p14:creationId xmlns:p14="http://schemas.microsoft.com/office/powerpoint/2010/main" val="1315620987"/>
+      </p:ext>
+    </p:extLst>
+  </p:cSld>
+  <p:clrMapOvr>
+    <a:masterClrMapping/>
+  </p:clrMapOvr>
+</p:notes>
 </file>
 
 <file path=ppt/slideLayouts/slideLayout1.xml><?xml version="1.0" encoding="utf-8"?>
@@ -3181,70 +3618,70 @@
                 <a:gridCol w="812800">
                   <a:extLst>
                     <a:ext uri="{9D8B030D-6E8A-4147-A177-3AD203B41FA5}">
-                      <a16:colId xmlns:a16="http://schemas.microsoft.com/office/drawing/2014/main" val="3315738908"/>
+                      <a16:colId xmlns:a16="http://schemas.microsoft.com/office/drawing/2014/main" xmlns="" val="3315738908"/>
                     </a:ext>
                   </a:extLst>
                 </a:gridCol>
                 <a:gridCol w="812800">
                   <a:extLst>
                     <a:ext uri="{9D8B030D-6E8A-4147-A177-3AD203B41FA5}">
-                      <a16:colId xmlns:a16="http://schemas.microsoft.com/office/drawing/2014/main" val="56546491"/>
+                      <a16:colId xmlns:a16="http://schemas.microsoft.com/office/drawing/2014/main" xmlns="" val="56546491"/>
                     </a:ext>
                   </a:extLst>
                 </a:gridCol>
                 <a:gridCol w="812800">
                   <a:extLst>
                     <a:ext uri="{9D8B030D-6E8A-4147-A177-3AD203B41FA5}">
-                      <a16:colId xmlns:a16="http://schemas.microsoft.com/office/drawing/2014/main" val="842709045"/>
+                      <a16:colId xmlns:a16="http://schemas.microsoft.com/office/drawing/2014/main" xmlns="" val="842709045"/>
                     </a:ext>
                   </a:extLst>
                 </a:gridCol>
                 <a:gridCol w="812800">
                   <a:extLst>
                     <a:ext uri="{9D8B030D-6E8A-4147-A177-3AD203B41FA5}">
-                      <a16:colId xmlns:a16="http://schemas.microsoft.com/office/drawing/2014/main" val="1318386102"/>
+                      <a16:colId xmlns:a16="http://schemas.microsoft.com/office/drawing/2014/main" xmlns="" val="1318386102"/>
                     </a:ext>
                   </a:extLst>
                 </a:gridCol>
                 <a:gridCol w="812800">
                   <a:extLst>
                     <a:ext uri="{9D8B030D-6E8A-4147-A177-3AD203B41FA5}">
-                      <a16:colId xmlns:a16="http://schemas.microsoft.com/office/drawing/2014/main" val="845492545"/>
+                      <a16:colId xmlns:a16="http://schemas.microsoft.com/office/drawing/2014/main" xmlns="" val="845492545"/>
                     </a:ext>
                   </a:extLst>
                 </a:gridCol>
                 <a:gridCol w="812800">
                   <a:extLst>
                     <a:ext uri="{9D8B030D-6E8A-4147-A177-3AD203B41FA5}">
-                      <a16:colId xmlns:a16="http://schemas.microsoft.com/office/drawing/2014/main" val="3575098428"/>
+                      <a16:colId xmlns:a16="http://schemas.microsoft.com/office/drawing/2014/main" xmlns="" val="3575098428"/>
                     </a:ext>
                   </a:extLst>
                 </a:gridCol>
                 <a:gridCol w="812800">
                   <a:extLst>
                     <a:ext uri="{9D8B030D-6E8A-4147-A177-3AD203B41FA5}">
-                      <a16:colId xmlns:a16="http://schemas.microsoft.com/office/drawing/2014/main" val="2721684344"/>
+                      <a16:colId xmlns:a16="http://schemas.microsoft.com/office/drawing/2014/main" xmlns="" val="2721684344"/>
                     </a:ext>
                   </a:extLst>
                 </a:gridCol>
                 <a:gridCol w="812800">
                   <a:extLst>
                     <a:ext uri="{9D8B030D-6E8A-4147-A177-3AD203B41FA5}">
-                      <a16:colId xmlns:a16="http://schemas.microsoft.com/office/drawing/2014/main" val="3851897766"/>
+                      <a16:colId xmlns:a16="http://schemas.microsoft.com/office/drawing/2014/main" xmlns="" val="3851897766"/>
                     </a:ext>
                   </a:extLst>
                 </a:gridCol>
                 <a:gridCol w="812800">
                   <a:extLst>
                     <a:ext uri="{9D8B030D-6E8A-4147-A177-3AD203B41FA5}">
-                      <a16:colId xmlns:a16="http://schemas.microsoft.com/office/drawing/2014/main" val="1567145589"/>
+                      <a16:colId xmlns:a16="http://schemas.microsoft.com/office/drawing/2014/main" xmlns="" val="1567145589"/>
                     </a:ext>
                   </a:extLst>
                 </a:gridCol>
                 <a:gridCol w="812800">
                   <a:extLst>
                     <a:ext uri="{9D8B030D-6E8A-4147-A177-3AD203B41FA5}">
-                      <a16:colId xmlns:a16="http://schemas.microsoft.com/office/drawing/2014/main" val="4217066330"/>
+                      <a16:colId xmlns:a16="http://schemas.microsoft.com/office/drawing/2014/main" xmlns="" val="4217066330"/>
                     </a:ext>
                   </a:extLst>
                 </a:gridCol>
@@ -3396,7 +3833,7 @@
                 </a:tc>
                 <a:extLst>
                   <a:ext uri="{0D108BD9-81ED-4DB2-BD59-A6C34878D82A}">
-                    <a16:rowId xmlns:a16="http://schemas.microsoft.com/office/drawing/2014/main" val="2639230025"/>
+                    <a16:rowId xmlns:a16="http://schemas.microsoft.com/office/drawing/2014/main" xmlns="" val="2639230025"/>
                   </a:ext>
                 </a:extLst>
               </a:tr>
@@ -3433,11 +3870,7 @@
                     <a:p>
                       <a:r>
                         <a:rPr lang="en-US" sz="1200" dirty="0" smtClean="0"/>
-                        <a:t>Cities: KHI</a:t>
-                      </a:r>
-                      <a:r>
-                        <a:rPr lang="en-US" sz="1200" dirty="0" smtClean="0"/>
-                        <a:t>, LHR, ISB</a:t>
+                        <a:t>Cities: KHI, LHR, ISB</a:t>
                       </a:r>
                       <a:endParaRPr lang="en-US" sz="1200" dirty="0"/>
                     </a:p>
@@ -3530,7 +3963,7 @@
                 </a:tc>
                 <a:extLst>
                   <a:ext uri="{0D108BD9-81ED-4DB2-BD59-A6C34878D82A}">
-                    <a16:rowId xmlns:a16="http://schemas.microsoft.com/office/drawing/2014/main" val="1203885534"/>
+                    <a16:rowId xmlns:a16="http://schemas.microsoft.com/office/drawing/2014/main" xmlns="" val="1203885534"/>
                   </a:ext>
                 </a:extLst>
               </a:tr>
@@ -3637,7 +4070,7 @@
                 </a:tc>
                 <a:extLst>
                   <a:ext uri="{0D108BD9-81ED-4DB2-BD59-A6C34878D82A}">
-                    <a16:rowId xmlns:a16="http://schemas.microsoft.com/office/drawing/2014/main" val="3433067710"/>
+                    <a16:rowId xmlns:a16="http://schemas.microsoft.com/office/drawing/2014/main" xmlns="" val="3433067710"/>
                   </a:ext>
                 </a:extLst>
               </a:tr>
@@ -3744,7 +4177,7 @@
                 </a:tc>
                 <a:extLst>
                   <a:ext uri="{0D108BD9-81ED-4DB2-BD59-A6C34878D82A}">
-                    <a16:rowId xmlns:a16="http://schemas.microsoft.com/office/drawing/2014/main" val="2053288043"/>
+                    <a16:rowId xmlns:a16="http://schemas.microsoft.com/office/drawing/2014/main" xmlns="" val="2053288043"/>
                   </a:ext>
                 </a:extLst>
               </a:tr>
@@ -4042,9 +4475,19 @@
             <a:endParaRPr lang="en-US" dirty="0" smtClean="0"/>
           </a:p>
           <a:p>
+            <a:endParaRPr lang="en-US" dirty="0" smtClean="0"/>
+          </a:p>
+          <a:p>
+            <a:endParaRPr lang="en-US" dirty="0" smtClean="0"/>
+          </a:p>
+          <a:p>
             <a:r>
               <a:rPr lang="en-US" dirty="0" smtClean="0"/>
-              <a:t>Existing Offers:</a:t>
+              <a:t>Existing </a:t>
+            </a:r>
+            <a:r>
+              <a:rPr lang="en-US" dirty="0" smtClean="0"/>
+              <a:t>Offers:</a:t>
             </a:r>
             <a:endParaRPr lang="en-US" dirty="0"/>
           </a:p>
@@ -4062,14 +4505,14 @@
           <p:nvPr>
             <p:extLst>
               <p:ext uri="{D42A27DB-BD31-4B8C-83A1-F6EECF244321}">
-                <p14:modId xmlns:p14="http://schemas.microsoft.com/office/powerpoint/2010/main" val="2049755890"/>
+                <p14:modId xmlns:p14="http://schemas.microsoft.com/office/powerpoint/2010/main" val="1270006486"/>
               </p:ext>
             </p:extLst>
           </p:nvPr>
         </p:nvGraphicFramePr>
         <p:xfrm>
           <a:off x="838200" y="919685"/>
-          <a:ext cx="8148639" cy="1406315"/>
+          <a:ext cx="8730801" cy="2103120"/>
         </p:xfrm>
         <a:graphic>
           <a:graphicData uri="http://schemas.openxmlformats.org/drawingml/2006/table">
@@ -4078,27 +4521,29 @@
                 <a:tableStyleId>{5C22544A-7EE6-4342-B048-85BDC9FD1C3A}</a:tableStyleId>
               </a:tblPr>
               <a:tblGrid>
-                <a:gridCol w="2664587">
+                <a:gridCol w="1706485">
                   <a:extLst>
                     <a:ext uri="{9D8B030D-6E8A-4147-A177-3AD203B41FA5}">
-                      <a16:colId xmlns:a16="http://schemas.microsoft.com/office/drawing/2014/main" val="3239240332"/>
+                      <a16:colId xmlns:a16="http://schemas.microsoft.com/office/drawing/2014/main" xmlns="" val="3239240332"/>
                     </a:ext>
                   </a:extLst>
                 </a:gridCol>
-                <a:gridCol w="2742026">
+                <a:gridCol w="1756079">
                   <a:extLst>
                     <a:ext uri="{9D8B030D-6E8A-4147-A177-3AD203B41FA5}">
-                      <a16:colId xmlns:a16="http://schemas.microsoft.com/office/drawing/2014/main" val="2047413741"/>
+                      <a16:colId xmlns:a16="http://schemas.microsoft.com/office/drawing/2014/main" xmlns="" val="2047413741"/>
                     </a:ext>
                   </a:extLst>
                 </a:gridCol>
-                <a:gridCol w="2742026">
+                <a:gridCol w="1756079">
                   <a:extLst>
                     <a:ext uri="{9D8B030D-6E8A-4147-A177-3AD203B41FA5}">
-                      <a16:colId xmlns:a16="http://schemas.microsoft.com/office/drawing/2014/main" val="2383045829"/>
+                      <a16:colId xmlns:a16="http://schemas.microsoft.com/office/drawing/2014/main" xmlns="" val="2383045829"/>
                     </a:ext>
                   </a:extLst>
                 </a:gridCol>
+                <a:gridCol w="1756079"/>
+                <a:gridCol w="1756079"/>
               </a:tblGrid>
               <a:tr h="766235">
                 <a:tc>
@@ -4149,9 +4594,37 @@
                   </a:txBody>
                   <a:tcPr/>
                 </a:tc>
+                <a:tc>
+                  <a:txBody>
+                    <a:bodyPr/>
+                    <a:lstStyle/>
+                    <a:p>
+                      <a:r>
+                        <a:rPr lang="en-US" dirty="0" smtClean="0"/>
+                        <a:t>Other Terms</a:t>
+                      </a:r>
+                      <a:endParaRPr lang="en-US" dirty="0"/>
+                    </a:p>
+                  </a:txBody>
+                  <a:tcPr/>
+                </a:tc>
+                <a:tc>
+                  <a:txBody>
+                    <a:bodyPr/>
+                    <a:lstStyle/>
+                    <a:p>
+                      <a:r>
+                        <a:rPr lang="en-US" dirty="0" smtClean="0"/>
+                        <a:t>Disabled</a:t>
+                      </a:r>
+                      <a:endParaRPr lang="en-US" dirty="0"/>
+                    </a:p>
+                  </a:txBody>
+                  <a:tcPr/>
+                </a:tc>
                 <a:extLst>
                   <a:ext uri="{0D108BD9-81ED-4DB2-BD59-A6C34878D82A}">
-                    <a16:rowId xmlns:a16="http://schemas.microsoft.com/office/drawing/2014/main" val="1618094335"/>
+                    <a16:rowId xmlns:a16="http://schemas.microsoft.com/office/drawing/2014/main" xmlns="" val="1618094335"/>
                   </a:ext>
                 </a:extLst>
               </a:tr>
@@ -4181,11 +4654,7 @@
                       </a:r>
                       <a:r>
                         <a:rPr lang="en-US" baseline="0" dirty="0" smtClean="0"/>
-                        <a:t> Type-A [offer] [validity date picker</a:t>
-                      </a:r>
-                      <a:r>
-                        <a:rPr lang="en-US" baseline="0" dirty="0" smtClean="0"/>
-                        <a:t>]  [</a:t>
+                        <a:t> Type-A [offer] [validity date picker]  [</a:t>
                       </a:r>
                       <a:r>
                         <a:rPr lang="en-US" baseline="0" dirty="0" err="1" smtClean="0"/>
@@ -4235,9 +4704,79 @@
                   </a:txBody>
                   <a:tcPr/>
                 </a:tc>
+                <a:tc>
+                  <a:txBody>
+                    <a:bodyPr/>
+                    <a:lstStyle/>
+                    <a:p>
+                      <a:pPr marL="0" marR="0" indent="0" algn="l" defTabSz="914400" rtl="0" eaLnBrk="1" fontAlgn="auto" latinLnBrk="0" hangingPunct="1">
+                        <a:lnSpc>
+                          <a:spcPct val="100000"/>
+                        </a:lnSpc>
+                        <a:spcBef>
+                          <a:spcPts val="0"/>
+                        </a:spcBef>
+                        <a:spcAft>
+                          <a:spcPts val="0"/>
+                        </a:spcAft>
+                        <a:buClrTx/>
+                        <a:buSzTx/>
+                        <a:buFontTx/>
+                        <a:buNone/>
+                        <a:tabLst/>
+                        <a:defRPr/>
+                      </a:pPr>
+                      <a:r>
+                        <a:rPr lang="en-US" b="1" dirty="0" smtClean="0"/>
+                        <a:t>Other terms text</a:t>
+                      </a:r>
+                      <a:endParaRPr lang="en-US" b="1" dirty="0" smtClean="0"/>
+                    </a:p>
+                  </a:txBody>
+                  <a:tcPr/>
+                </a:tc>
+                <a:tc>
+                  <a:txBody>
+                    <a:bodyPr/>
+                    <a:lstStyle/>
+                    <a:p>
+                      <a:pPr marL="0" marR="0" indent="0" algn="l" defTabSz="914400" rtl="0" eaLnBrk="1" fontAlgn="auto" latinLnBrk="0" hangingPunct="1">
+                        <a:lnSpc>
+                          <a:spcPct val="100000"/>
+                        </a:lnSpc>
+                        <a:spcBef>
+                          <a:spcPts val="0"/>
+                        </a:spcBef>
+                        <a:spcAft>
+                          <a:spcPts val="0"/>
+                        </a:spcAft>
+                        <a:buClrTx/>
+                        <a:buSzTx/>
+                        <a:buFontTx/>
+                        <a:buNone/>
+                        <a:tabLst/>
+                        <a:defRPr/>
+                      </a:pPr>
+                      <a:r>
+                        <a:rPr lang="en-US" b="1" dirty="0" smtClean="0"/>
+                        <a:t>[check</a:t>
+                      </a:r>
+                      <a:r>
+                        <a:rPr lang="en-US" b="1" baseline="0" dirty="0" smtClean="0"/>
+                        <a:t> box</a:t>
+                      </a:r>
+                      <a:r>
+                        <a:rPr lang="en-US" b="1" dirty="0" smtClean="0"/>
+                        <a:t>]</a:t>
+                      </a:r>
+                      <a:endParaRPr lang="en-US" b="1" dirty="0" smtClean="0"/>
+                    </a:p>
+                  </a:txBody>
+                  <a:tcPr/>
+                </a:tc>
                 <a:extLst>
                   <a:ext uri="{0D108BD9-81ED-4DB2-BD59-A6C34878D82A}">
-                    <a16:rowId xmlns:a16="http://schemas.microsoft.com/office/drawing/2014/main" val="2522030387"/>
+                    <a16:rowId xmlns:a16="http://schemas.microsoft.com/office/drawing/2014/main" xmlns="" val="2522030387"/>
                   </a:ext>
                 </a:extLst>
               </a:tr>
@@ -4254,13 +4793,13 @@
           <p:nvPr>
             <p:extLst>
               <p:ext uri="{D42A27DB-BD31-4B8C-83A1-F6EECF244321}">
-                <p14:modId xmlns:p14="http://schemas.microsoft.com/office/powerpoint/2010/main" val="1246160542"/>
+                <p14:modId xmlns:p14="http://schemas.microsoft.com/office/powerpoint/2010/main" val="2408198817"/>
               </p:ext>
             </p:extLst>
           </p:nvPr>
         </p:nvGraphicFramePr>
         <p:xfrm>
-          <a:off x="838201" y="3077100"/>
+          <a:off x="838201" y="4133172"/>
           <a:ext cx="10991853" cy="1406315"/>
         </p:xfrm>
         <a:graphic>
@@ -4273,42 +4812,42 @@
                 <a:gridCol w="1743492">
                   <a:extLst>
                     <a:ext uri="{9D8B030D-6E8A-4147-A177-3AD203B41FA5}">
-                      <a16:colId xmlns:a16="http://schemas.microsoft.com/office/drawing/2014/main" val="3239240332"/>
+                      <a16:colId xmlns:a16="http://schemas.microsoft.com/office/drawing/2014/main" xmlns="" val="3239240332"/>
                     </a:ext>
                   </a:extLst>
                 </a:gridCol>
                 <a:gridCol w="4247732">
                   <a:extLst>
                     <a:ext uri="{9D8B030D-6E8A-4147-A177-3AD203B41FA5}">
-                      <a16:colId xmlns:a16="http://schemas.microsoft.com/office/drawing/2014/main" val="2047413741"/>
+                      <a16:colId xmlns:a16="http://schemas.microsoft.com/office/drawing/2014/main" xmlns="" val="2047413741"/>
                     </a:ext>
                   </a:extLst>
                 </a:gridCol>
                 <a:gridCol w="1471613">
                   <a:extLst>
                     <a:ext uri="{9D8B030D-6E8A-4147-A177-3AD203B41FA5}">
-                      <a16:colId xmlns:a16="http://schemas.microsoft.com/office/drawing/2014/main" val="4033075043"/>
+                      <a16:colId xmlns:a16="http://schemas.microsoft.com/office/drawing/2014/main" xmlns="" val="4033075043"/>
                     </a:ext>
                   </a:extLst>
                 </a:gridCol>
                 <a:gridCol w="1514475">
                   <a:extLst>
                     <a:ext uri="{9D8B030D-6E8A-4147-A177-3AD203B41FA5}">
-                      <a16:colId xmlns:a16="http://schemas.microsoft.com/office/drawing/2014/main" val="3141731509"/>
+                      <a16:colId xmlns:a16="http://schemas.microsoft.com/office/drawing/2014/main" xmlns="" val="3141731509"/>
                     </a:ext>
                   </a:extLst>
                 </a:gridCol>
                 <a:gridCol w="857250">
                   <a:extLst>
                     <a:ext uri="{9D8B030D-6E8A-4147-A177-3AD203B41FA5}">
-                      <a16:colId xmlns:a16="http://schemas.microsoft.com/office/drawing/2014/main" val="4037730056"/>
+                      <a16:colId xmlns:a16="http://schemas.microsoft.com/office/drawing/2014/main" xmlns="" val="4037730056"/>
                     </a:ext>
                   </a:extLst>
                 </a:gridCol>
                 <a:gridCol w="1157291">
                   <a:extLst>
                     <a:ext uri="{9D8B030D-6E8A-4147-A177-3AD203B41FA5}">
-                      <a16:colId xmlns:a16="http://schemas.microsoft.com/office/drawing/2014/main" val="482923499"/>
+                      <a16:colId xmlns:a16="http://schemas.microsoft.com/office/drawing/2014/main" xmlns="" val="482923499"/>
                     </a:ext>
                   </a:extLst>
                 </a:gridCol>
@@ -4323,7 +4862,6 @@
                         <a:rPr lang="en-US" dirty="0" smtClean="0"/>
                         <a:t>Restaurant</a:t>
                       </a:r>
-                      <a:endParaRPr lang="en-US" dirty="0" smtClean="0"/>
                     </a:p>
                   </a:txBody>
                   <a:tcPr/>
@@ -4377,7 +4915,7 @@
                     <a:p>
                       <a:r>
                         <a:rPr lang="en-US" dirty="0" smtClean="0"/>
-                        <a:t>Enabled</a:t>
+                        <a:t>Disabled</a:t>
                       </a:r>
                       <a:endParaRPr lang="en-US" dirty="0"/>
                     </a:p>
@@ -4400,7 +4938,7 @@
                 </a:tc>
                 <a:extLst>
                   <a:ext uri="{0D108BD9-81ED-4DB2-BD59-A6C34878D82A}">
-                    <a16:rowId xmlns:a16="http://schemas.microsoft.com/office/drawing/2014/main" val="1618094335"/>
+                    <a16:rowId xmlns:a16="http://schemas.microsoft.com/office/drawing/2014/main" xmlns="" val="1618094335"/>
                   </a:ext>
                 </a:extLst>
               </a:tr>
@@ -4434,11 +4972,7 @@
                       </a:r>
                       <a:r>
                         <a:rPr lang="en-US" baseline="0" dirty="0" smtClean="0"/>
-                        <a:t> Type-A [offer] [validity date picker</a:t>
-                      </a:r>
-                      <a:r>
-                        <a:rPr lang="en-US" baseline="0" dirty="0" smtClean="0"/>
-                        <a:t>]</a:t>
+                        <a:t> Type-A [offer] [validity date picker]</a:t>
                       </a:r>
                       <a:endParaRPr lang="en-US" dirty="0"/>
                     </a:p>
@@ -4506,7 +5040,7 @@
                 </a:tc>
                 <a:extLst>
                   <a:ext uri="{0D108BD9-81ED-4DB2-BD59-A6C34878D82A}">
-                    <a16:rowId xmlns:a16="http://schemas.microsoft.com/office/drawing/2014/main" val="2522030387"/>
+                    <a16:rowId xmlns:a16="http://schemas.microsoft.com/office/drawing/2014/main" xmlns="" val="2522030387"/>
                   </a:ext>
                 </a:extLst>
               </a:tr>
@@ -4516,57 +5050,13 @@
       </p:graphicFrame>
       <p:sp>
         <p:nvSpPr>
-          <p:cNvPr id="6" name="Rounded Rectangle 5"/>
-          <p:cNvSpPr/>
-          <p:nvPr/>
-        </p:nvSpPr>
-        <p:spPr>
-          <a:xfrm>
-            <a:off x="10048875" y="1622842"/>
-            <a:ext cx="1042988" cy="504721"/>
-          </a:xfrm>
-          <a:prstGeom prst="roundRect">
-            <a:avLst/>
-          </a:prstGeom>
-        </p:spPr>
-        <p:style>
-          <a:lnRef idx="2">
-            <a:schemeClr val="accent1">
-              <a:shade val="50000"/>
-            </a:schemeClr>
-          </a:lnRef>
-          <a:fillRef idx="1">
-            <a:schemeClr val="accent1"/>
-          </a:fillRef>
-          <a:effectRef idx="0">
-            <a:schemeClr val="accent1"/>
-          </a:effectRef>
-          <a:fontRef idx="minor">
-            <a:schemeClr val="lt1"/>
-          </a:fontRef>
-        </p:style>
-        <p:txBody>
-          <a:bodyPr rtlCol="0" anchor="ctr"/>
-          <a:lstStyle/>
-          <a:p>
-            <a:pPr algn="ctr"/>
-            <a:r>
-              <a:rPr lang="en-US" dirty="0" smtClean="0"/>
-              <a:t>Enable/Disable</a:t>
-            </a:r>
-            <a:endParaRPr lang="en-US" dirty="0"/>
-          </a:p>
-        </p:txBody>
-      </p:sp>
-      <p:sp>
-        <p:nvSpPr>
           <p:cNvPr id="10" name="Rounded Rectangle 9"/>
           <p:cNvSpPr/>
           <p:nvPr/>
         </p:nvSpPr>
         <p:spPr>
           <a:xfrm>
-            <a:off x="11249025" y="1622842"/>
+            <a:off x="9999774" y="1849548"/>
             <a:ext cx="1042988" cy="504721"/>
           </a:xfrm>
           <a:prstGeom prst="roundRect">
@@ -4746,7 +5236,7 @@
     </a:clrScheme>
     <a:fontScheme name="Office">
       <a:majorFont>
-        <a:latin typeface="Calibri Light" panose="020F0302020204030204"/>
+        <a:latin typeface="Calibri Light"/>
         <a:ea typeface=""/>
         <a:cs typeface=""/>
         <a:font script="Jpan" typeface="游ゴシック Light"/>
@@ -4781,7 +5271,7 @@
         <a:font script="Geor" typeface="Sylfaen"/>
       </a:majorFont>
       <a:minorFont>
-        <a:latin typeface="Calibri" panose="020F0502020204030204"/>
+        <a:latin typeface="Calibri"/>
         <a:ea typeface=""/>
         <a:cs typeface=""/>
         <a:font script="Jpan" typeface="游ゴシック"/>
@@ -4958,8 +5448,293 @@
   <a:extraClrSchemeLst/>
   <a:extLst>
     <a:ext uri="{05A4C25C-085E-4340-85A3-A5531E510DB2}">
-      <thm15:themeFamily xmlns:thm15="http://schemas.microsoft.com/office/thememl/2012/main" name="Office Theme" id="{62F939B6-93AF-4DB8-9C6B-D6C7DFDC589F}" vid="{4A3C46E8-61CC-4603-A589-7422A47A8E4A}"/>
+      <thm15:themeFamily xmlns:thm15="http://schemas.microsoft.com/office/thememl/2012/main" xmlns="" name="Office Theme" id="{62F939B6-93AF-4DB8-9C6B-D6C7DFDC589F}" vid="{4A3C46E8-61CC-4603-A589-7422A47A8E4A}"/>
     </a:ext>
   </a:extLst>
 </a:theme>
+</file>
+
+<file path=ppt/theme/theme2.xml><?xml version="1.0" encoding="utf-8"?>
+<a:theme xmlns:a="http://schemas.openxmlformats.org/drawingml/2006/main" name="Office Theme">
+  <a:themeElements>
+    <a:clrScheme name="Office">
+      <a:dk1>
+        <a:sysClr val="windowText" lastClr="000000"/>
+      </a:dk1>
+      <a:lt1>
+        <a:sysClr val="window" lastClr="FFFFFF"/>
+      </a:lt1>
+      <a:dk2>
+        <a:srgbClr val="1F497D"/>
+      </a:dk2>
+      <a:lt2>
+        <a:srgbClr val="EEECE1"/>
+      </a:lt2>
+      <a:accent1>
+        <a:srgbClr val="4F81BD"/>
+      </a:accent1>
+      <a:accent2>
+        <a:srgbClr val="C0504D"/>
+      </a:accent2>
+      <a:accent3>
+        <a:srgbClr val="9BBB59"/>
+      </a:accent3>
+      <a:accent4>
+        <a:srgbClr val="8064A2"/>
+      </a:accent4>
+      <a:accent5>
+        <a:srgbClr val="4BACC6"/>
+      </a:accent5>
+      <a:accent6>
+        <a:srgbClr val="F79646"/>
+      </a:accent6>
+      <a:hlink>
+        <a:srgbClr val="0000FF"/>
+      </a:hlink>
+      <a:folHlink>
+        <a:srgbClr val="800080"/>
+      </a:folHlink>
+    </a:clrScheme>
+    <a:fontScheme name="Office">
+      <a:majorFont>
+        <a:latin typeface="Calibri"/>
+        <a:ea typeface=""/>
+        <a:cs typeface=""/>
+        <a:font script="Jpan" typeface="ＭＳ Ｐゴシック"/>
+        <a:font script="Hang" typeface="맑은 고딕"/>
+        <a:font script="Hans" typeface="宋体"/>
+        <a:font script="Hant" typeface="新細明體"/>
+        <a:font script="Arab" typeface="Times New Roman"/>
+        <a:font script="Hebr" typeface="Times New Roman"/>
+        <a:font script="Thai" typeface="Angsana New"/>
+        <a:font script="Ethi" typeface="Nyala"/>
+        <a:font script="Beng" typeface="Vrinda"/>
+        <a:font script="Gujr" typeface="Shruti"/>
+        <a:font script="Khmr" typeface="MoolBoran"/>
+        <a:font script="Knda" typeface="Tunga"/>
+        <a:font script="Guru" typeface="Raavi"/>
+        <a:font script="Cans" typeface="Euphemia"/>
+        <a:font script="Cher" typeface="Plantagenet Cherokee"/>
+        <a:font script="Yiii" typeface="Microsoft Yi Baiti"/>
+        <a:font script="Tibt" typeface="Microsoft Himalaya"/>
+        <a:font script="Thaa" typeface="MV Boli"/>
+        <a:font script="Deva" typeface="Mangal"/>
+        <a:font script="Telu" typeface="Gautami"/>
+        <a:font script="Taml" typeface="Latha"/>
+        <a:font script="Syrc" typeface="Estrangelo Edessa"/>
+        <a:font script="Orya" typeface="Kalinga"/>
+        <a:font script="Mlym" typeface="Kartika"/>
+        <a:font script="Laoo" typeface="DokChampa"/>
+        <a:font script="Sinh" typeface="Iskoola Pota"/>
+        <a:font script="Mong" typeface="Mongolian Baiti"/>
+        <a:font script="Viet" typeface="Times New Roman"/>
+        <a:font script="Uigh" typeface="Microsoft Uighur"/>
+        <a:font script="Geor" typeface="Sylfaen"/>
+      </a:majorFont>
+      <a:minorFont>
+        <a:latin typeface="Calibri"/>
+        <a:ea typeface=""/>
+        <a:cs typeface=""/>
+        <a:font script="Jpan" typeface="ＭＳ Ｐゴシック"/>
+        <a:font script="Hang" typeface="맑은 고딕"/>
+        <a:font script="Hans" typeface="宋体"/>
+        <a:font script="Hant" typeface="新細明體"/>
+        <a:font script="Arab" typeface="Arial"/>
+        <a:font script="Hebr" typeface="Arial"/>
+        <a:font script="Thai" typeface="Cordia New"/>
+        <a:font script="Ethi" typeface="Nyala"/>
+        <a:font script="Beng" typeface="Vrinda"/>
+        <a:font script="Gujr" typeface="Shruti"/>
+        <a:font script="Khmr" typeface="DaunPenh"/>
+        <a:font script="Knda" typeface="Tunga"/>
+        <a:font script="Guru" typeface="Raavi"/>
+        <a:font script="Cans" typeface="Euphemia"/>
+        <a:font script="Cher" typeface="Plantagenet Cherokee"/>
+        <a:font script="Yiii" typeface="Microsoft Yi Baiti"/>
+        <a:font script="Tibt" typeface="Microsoft Himalaya"/>
+        <a:font script="Thaa" typeface="MV Boli"/>
+        <a:font script="Deva" typeface="Mangal"/>
+        <a:font script="Telu" typeface="Gautami"/>
+        <a:font script="Taml" typeface="Latha"/>
+        <a:font script="Syrc" typeface="Estrangelo Edessa"/>
+        <a:font script="Orya" typeface="Kalinga"/>
+        <a:font script="Mlym" typeface="Kartika"/>
+        <a:font script="Laoo" typeface="DokChampa"/>
+        <a:font script="Sinh" typeface="Iskoola Pota"/>
+        <a:font script="Mong" typeface="Mongolian Baiti"/>
+        <a:font script="Viet" typeface="Arial"/>
+        <a:font script="Uigh" typeface="Microsoft Uighur"/>
+        <a:font script="Geor" typeface="Sylfaen"/>
+      </a:minorFont>
+    </a:fontScheme>
+    <a:fmtScheme name="Office">
+      <a:fillStyleLst>
+        <a:solidFill>
+          <a:schemeClr val="phClr"/>
+        </a:solidFill>
+        <a:gradFill rotWithShape="1">
+          <a:gsLst>
+            <a:gs pos="0">
+              <a:schemeClr val="phClr">
+                <a:tint val="50000"/>
+                <a:satMod val="300000"/>
+              </a:schemeClr>
+            </a:gs>
+            <a:gs pos="35000">
+              <a:schemeClr val="phClr">
+                <a:tint val="37000"/>
+                <a:satMod val="300000"/>
+              </a:schemeClr>
+            </a:gs>
+            <a:gs pos="100000">
+              <a:schemeClr val="phClr">
+                <a:tint val="15000"/>
+                <a:satMod val="350000"/>
+              </a:schemeClr>
+            </a:gs>
+          </a:gsLst>
+          <a:lin ang="16200000" scaled="1"/>
+        </a:gradFill>
+        <a:gradFill rotWithShape="1">
+          <a:gsLst>
+            <a:gs pos="0">
+              <a:schemeClr val="phClr">
+                <a:shade val="51000"/>
+                <a:satMod val="130000"/>
+              </a:schemeClr>
+            </a:gs>
+            <a:gs pos="80000">
+              <a:schemeClr val="phClr">
+                <a:shade val="93000"/>
+                <a:satMod val="130000"/>
+              </a:schemeClr>
+            </a:gs>
+            <a:gs pos="100000">
+              <a:schemeClr val="phClr">
+                <a:shade val="94000"/>
+                <a:satMod val="135000"/>
+              </a:schemeClr>
+            </a:gs>
+          </a:gsLst>
+          <a:lin ang="16200000" scaled="0"/>
+        </a:gradFill>
+      </a:fillStyleLst>
+      <a:lnStyleLst>
+        <a:ln w="9525" cap="flat" cmpd="sng" algn="ctr">
+          <a:solidFill>
+            <a:schemeClr val="phClr">
+              <a:shade val="95000"/>
+              <a:satMod val="105000"/>
+            </a:schemeClr>
+          </a:solidFill>
+          <a:prstDash val="solid"/>
+        </a:ln>
+        <a:ln w="25400" cap="flat" cmpd="sng" algn="ctr">
+          <a:solidFill>
+            <a:schemeClr val="phClr"/>
+          </a:solidFill>
+          <a:prstDash val="solid"/>
+        </a:ln>
+        <a:ln w="38100" cap="flat" cmpd="sng" algn="ctr">
+          <a:solidFill>
+            <a:schemeClr val="phClr"/>
+          </a:solidFill>
+          <a:prstDash val="solid"/>
+        </a:ln>
+      </a:lnStyleLst>
+      <a:effectStyleLst>
+        <a:effectStyle>
+          <a:effectLst>
+            <a:outerShdw blurRad="40000" dist="20000" dir="5400000" rotWithShape="0">
+              <a:srgbClr val="000000">
+                <a:alpha val="38000"/>
+              </a:srgbClr>
+            </a:outerShdw>
+          </a:effectLst>
+        </a:effectStyle>
+        <a:effectStyle>
+          <a:effectLst>
+            <a:outerShdw blurRad="40000" dist="23000" dir="5400000" rotWithShape="0">
+              <a:srgbClr val="000000">
+                <a:alpha val="35000"/>
+              </a:srgbClr>
+            </a:outerShdw>
+          </a:effectLst>
+        </a:effectStyle>
+        <a:effectStyle>
+          <a:effectLst>
+            <a:outerShdw blurRad="40000" dist="23000" dir="5400000" rotWithShape="0">
+              <a:srgbClr val="000000">
+                <a:alpha val="35000"/>
+              </a:srgbClr>
+            </a:outerShdw>
+          </a:effectLst>
+          <a:scene3d>
+            <a:camera prst="orthographicFront">
+              <a:rot lat="0" lon="0" rev="0"/>
+            </a:camera>
+            <a:lightRig rig="threePt" dir="t">
+              <a:rot lat="0" lon="0" rev="1200000"/>
+            </a:lightRig>
+          </a:scene3d>
+          <a:sp3d>
+            <a:bevelT w="63500" h="25400"/>
+          </a:sp3d>
+        </a:effectStyle>
+      </a:effectStyleLst>
+      <a:bgFillStyleLst>
+        <a:solidFill>
+          <a:schemeClr val="phClr"/>
+        </a:solidFill>
+        <a:gradFill rotWithShape="1">
+          <a:gsLst>
+            <a:gs pos="0">
+              <a:schemeClr val="phClr">
+                <a:tint val="40000"/>
+                <a:satMod val="350000"/>
+              </a:schemeClr>
+            </a:gs>
+            <a:gs pos="40000">
+              <a:schemeClr val="phClr">
+                <a:tint val="45000"/>
+                <a:shade val="99000"/>
+                <a:satMod val="350000"/>
+              </a:schemeClr>
+            </a:gs>
+            <a:gs pos="100000">
+              <a:schemeClr val="phClr">
+                <a:shade val="20000"/>
+                <a:satMod val="255000"/>
+              </a:schemeClr>
+            </a:gs>
+          </a:gsLst>
+          <a:path path="circle">
+            <a:fillToRect l="50000" t="-80000" r="50000" b="180000"/>
+          </a:path>
+        </a:gradFill>
+        <a:gradFill rotWithShape="1">
+          <a:gsLst>
+            <a:gs pos="0">
+              <a:schemeClr val="phClr">
+                <a:tint val="80000"/>
+                <a:satMod val="300000"/>
+              </a:schemeClr>
+            </a:gs>
+            <a:gs pos="100000">
+              <a:schemeClr val="phClr">
+                <a:shade val="30000"/>
+                <a:satMod val="200000"/>
+              </a:schemeClr>
+            </a:gs>
+          </a:gsLst>
+          <a:path path="circle">
+            <a:fillToRect l="50000" t="50000" r="50000" b="50000"/>
+          </a:path>
+        </a:gradFill>
+      </a:bgFillStyleLst>
+    </a:fmtScheme>
+  </a:themeElements>
+  <a:objectDefaults/>
+  <a:extraClrSchemeLst/>
+</a:theme>
 </file>
</xml_diff>